<commit_message>
Update price list and add instagram id
</commit_message>
<xml_diff>
--- a/img/price.pptx
+++ b/img/price.pptx
@@ -7766,7 +7766,7 @@
         </p:nvSpPr>
         <p:spPr>
           <a:xfrm>
-            <a:off x="298111" y="23648555"/>
+            <a:off x="298111" y="23696055"/>
             <a:ext cx="8473440" cy="646331"/>
           </a:xfrm>
           <a:prstGeom prst="rect">
@@ -7812,14 +7812,14 @@
           <p:nvPr>
             <p:extLst>
               <p:ext uri="{D42A27DB-BD31-4B8C-83A1-F6EECF244321}">
-                <p14:modId xmlns:p14="http://schemas.microsoft.com/office/powerpoint/2010/main" val="2180753699"/>
+                <p14:modId xmlns:p14="http://schemas.microsoft.com/office/powerpoint/2010/main" val="3777089197"/>
               </p:ext>
             </p:extLst>
           </p:nvPr>
         </p:nvGraphicFramePr>
         <p:xfrm>
-          <a:off x="-10564" y="24434972"/>
-          <a:ext cx="9111912" cy="2423160"/>
+          <a:off x="-10564" y="26963315"/>
+          <a:ext cx="9111912" cy="2392680"/>
         </p:xfrm>
         <a:graphic>
           <a:graphicData uri="http://schemas.openxmlformats.org/drawingml/2006/table">
@@ -7898,9 +7898,18 @@
                         <a:defRPr/>
                       </a:pPr>
                       <a:r>
-                        <a:rPr lang="en-US" altLang="ko-KR" sz="2200" dirty="0"/>
-                        <a:t>1:1</a:t>
-                      </a:r>
+                        <a:rPr lang="en-US" altLang="ko-KR" sz="2000" dirty="0"/>
+                        <a:t>(3~4</a:t>
+                      </a:r>
+                      <a:r>
+                        <a:rPr lang="ko-KR" altLang="en-US" sz="2000" dirty="0"/>
+                        <a:t>인</a:t>
+                      </a:r>
+                      <a:r>
+                        <a:rPr lang="en-US" altLang="ko-KR" sz="2000" dirty="0"/>
+                        <a:t>)</a:t>
+                      </a:r>
+                      <a:endParaRPr lang="en-US" altLang="ko-KR" sz="2200" dirty="0"/>
                     </a:p>
                   </a:txBody>
                   <a:tcPr marL="121920" marR="121920" marT="60960" marB="60960"/>
@@ -7952,9 +7961,10 @@
                         <a:defRPr/>
                       </a:pPr>
                       <a:r>
-                        <a:rPr lang="en-US" altLang="ko-KR" sz="2200" dirty="0"/>
+                        <a:rPr lang="en-US" altLang="ko-KR" sz="2000" dirty="0"/>
                         <a:t>2:1</a:t>
                       </a:r>
+                      <a:endParaRPr lang="en-US" altLang="ko-KR" sz="2200" dirty="0"/>
                     </a:p>
                   </a:txBody>
                   <a:tcPr marL="121920" marR="121920" marT="60960" marB="60960"/>
@@ -8006,17 +8016,10 @@
                         <a:defRPr/>
                       </a:pPr>
                       <a:r>
-                        <a:rPr lang="en-US" altLang="ko-KR" sz="2200" dirty="0"/>
-                        <a:t>(3~4</a:t>
-                      </a:r>
-                      <a:r>
-                        <a:rPr lang="ko-KR" altLang="en-US" sz="2200" dirty="0"/>
-                        <a:t>인</a:t>
-                      </a:r>
-                      <a:r>
-                        <a:rPr lang="en-US" altLang="ko-KR" sz="2200" dirty="0"/>
-                        <a:t>)</a:t>
-                      </a:r>
+                        <a:rPr lang="en-US" altLang="ko-KR" sz="2000" dirty="0"/>
+                        <a:t>1:1</a:t>
+                      </a:r>
+                      <a:endParaRPr lang="en-US" altLang="ko-KR" sz="2200" dirty="0"/>
                     </a:p>
                   </a:txBody>
                   <a:tcPr marL="121920" marR="121920" marT="60960" marB="60960"/>
@@ -8036,7 +8039,7 @@
                       <a:pPr algn="ctr"/>
                       <a:r>
                         <a:rPr lang="en-US" altLang="ko-KR" sz="2100" dirty="0"/>
-                        <a:t>20</a:t>
+                        <a:t>10</a:t>
                       </a:r>
                       <a:r>
                         <a:rPr lang="ko-KR" altLang="en-US" sz="2100" dirty="0"/>
@@ -8074,7 +8077,7 @@
                       <a:pPr algn="ctr"/>
                       <a:r>
                         <a:rPr lang="en-US" altLang="ko-KR" sz="2100" dirty="0"/>
-                        <a:t>10</a:t>
+                        <a:t>20</a:t>
                       </a:r>
                       <a:r>
                         <a:rPr lang="ko-KR" altLang="en-US" sz="2100" dirty="0"/>
@@ -8479,14 +8482,14 @@
           <p:nvPr>
             <p:extLst>
               <p:ext uri="{D42A27DB-BD31-4B8C-83A1-F6EECF244321}">
-                <p14:modId xmlns:p14="http://schemas.microsoft.com/office/powerpoint/2010/main" val="1908711533"/>
+                <p14:modId xmlns:p14="http://schemas.microsoft.com/office/powerpoint/2010/main" val="2428015181"/>
               </p:ext>
             </p:extLst>
           </p:nvPr>
         </p:nvGraphicFramePr>
         <p:xfrm>
-          <a:off x="-10564" y="26978880"/>
-          <a:ext cx="9111912" cy="2423160"/>
+          <a:off x="-10564" y="24343499"/>
+          <a:ext cx="9111912" cy="2392680"/>
         </p:xfrm>
         <a:graphic>
           <a:graphicData uri="http://schemas.openxmlformats.org/drawingml/2006/table">
@@ -8585,22 +8588,22 @@
                         <a:defRPr/>
                       </a:pPr>
                       <a:r>
-                        <a:rPr lang="en-US" altLang="ko-KR" sz="2200" dirty="0"/>
+                        <a:rPr lang="en-US" altLang="ko-KR" sz="2000" dirty="0"/>
                         <a:t>4</a:t>
                       </a:r>
                       <a:r>
-                        <a:rPr lang="ko-KR" altLang="en-US" sz="2200" dirty="0"/>
+                        <a:rPr lang="ko-KR" altLang="en-US" sz="2000" dirty="0"/>
                         <a:t>월</a:t>
                       </a:r>
                       <a:r>
-                        <a:rPr lang="en-US" altLang="ko-KR" sz="2200" dirty="0"/>
+                        <a:rPr lang="en-US" altLang="ko-KR" sz="2000" dirty="0"/>
                         <a:t>~11</a:t>
                       </a:r>
                       <a:r>
-                        <a:rPr lang="ko-KR" altLang="en-US" sz="2200" dirty="0"/>
+                        <a:rPr lang="ko-KR" altLang="en-US" sz="2000" dirty="0"/>
                         <a:t>월</a:t>
                       </a:r>
-                      <a:endParaRPr lang="en-US" altLang="ko-KR" sz="2200" dirty="0"/>
+                      <a:endParaRPr lang="en-US" altLang="ko-KR" sz="2000" dirty="0"/>
                     </a:p>
                   </a:txBody>
                   <a:tcPr marL="121920" marR="121920" marT="60960" marB="60960"/>
@@ -8679,23 +8682,23 @@
                         <a:defRPr/>
                       </a:pPr>
                       <a:r>
-                        <a:rPr lang="en-US" altLang="ko-KR" sz="2200" dirty="0"/>
+                        <a:rPr lang="en-US" altLang="ko-KR" sz="2000" dirty="0"/>
                         <a:t>12</a:t>
                       </a:r>
                       <a:r>
-                        <a:rPr lang="ko-KR" altLang="en-US" sz="2200" dirty="0"/>
+                        <a:rPr lang="ko-KR" altLang="en-US" sz="2000" dirty="0"/>
                         <a:t>월</a:t>
                       </a:r>
                       <a:r>
-                        <a:rPr lang="en-US" altLang="ko-KR" sz="2200" dirty="0"/>
+                        <a:rPr lang="en-US" altLang="ko-KR" sz="2000" dirty="0"/>
                         <a:t>~3</a:t>
                       </a:r>
                       <a:r>
-                        <a:rPr lang="ko-KR" altLang="en-US" sz="2200" dirty="0"/>
+                        <a:rPr lang="ko-KR" altLang="en-US" sz="2000" dirty="0"/>
                         <a:t>월 </a:t>
                       </a:r>
                       <a:r>
-                        <a:rPr lang="ko-KR" altLang="en-US" sz="2200" dirty="0" err="1"/>
+                        <a:rPr lang="ko-KR" altLang="en-US" sz="2000" dirty="0" err="1"/>
                         <a:t>겨울서핑</a:t>
                       </a:r>
                       <a:endParaRPr lang="en-US" altLang="ko-KR" sz="2200" dirty="0"/>
@@ -11975,7 +11978,7 @@
         </p:nvSpPr>
         <p:spPr>
           <a:xfrm>
-            <a:off x="7490009" y="29415838"/>
+            <a:off x="7490009" y="29403963"/>
             <a:ext cx="1621534" cy="461665"/>
           </a:xfrm>
           <a:prstGeom prst="rect">

</xml_diff>